<commit_message>
modify: cập nhật biểu đồ, slide, báo cáo
</commit_message>
<xml_diff>
--- a/presentation/Design_Pattern_Slide.pptx
+++ b/presentation/Design_Pattern_Slide.pptx
@@ -50,7 +50,7 @@
       <p:boldItalic r:id="rId36"/>
     </p:embeddedFont>
     <p:embeddedFont>
-      <p:font typeface="Lato" panose="020F0502020204030203" pitchFamily="34" charset="0"/>
+      <p:font typeface="Lato" panose="020B0604020202020204" charset="0"/>
       <p:regular r:id="rId37"/>
       <p:bold r:id="rId38"/>
       <p:italic r:id="rId39"/>
@@ -291,7 +291,7 @@
       <p15:sldGuideLst xmlns:p15="http://schemas.microsoft.com/office/powerpoint/2012/main"/>
     </p:ext>
     <p:ext uri="http://customooxmlschemas.google.com/">
-      <go:slidesCustomData xmlns="" xmlns:mc="http://schemas.openxmlformats.org/markup-compatibility/2006" xmlns:mv="urn:schemas-microsoft-com:mac:vml" xmlns:c="http://schemas.openxmlformats.org/drawingml/2006/chart" xmlns:dgm="http://schemas.openxmlformats.org/drawingml/2006/diagram" xmlns:o="urn:schemas-microsoft-com:office:office" xmlns:v="urn:schemas-microsoft-com:vml" xmlns:pvml="urn:schemas-microsoft-com:office:powerpoint" xmlns:com="http://schemas.openxmlformats.org/drawingml/2006/compatibility" xmlns:p14="http://schemas.microsoft.com/office/powerpoint/2010/main" xmlns:p15="http://schemas.microsoft.com/office/powerpoint/2012/main" xmlns:ahyp="http://schemas.microsoft.com/office/drawing/2018/hyperlinkcolor" xmlns:go="http://customooxmlschemas.google.com/" r:id="rId41" roundtripDataSignature="AMtx7mj558g+zs1o7BnEogSEStSFHJZ7WA=="/>
+      <go:slidesCustomData xmlns:go="http://customooxmlschemas.google.com/" xmlns:ahyp="http://schemas.microsoft.com/office/drawing/2018/hyperlinkcolor" xmlns:p15="http://schemas.microsoft.com/office/powerpoint/2012/main" xmlns:p14="http://schemas.microsoft.com/office/powerpoint/2010/main" xmlns:com="http://schemas.openxmlformats.org/drawingml/2006/compatibility" xmlns:pvml="urn:schemas-microsoft-com:office:powerpoint" xmlns:v="urn:schemas-microsoft-com:vml" xmlns:o="urn:schemas-microsoft-com:office:office" xmlns:dgm="http://schemas.openxmlformats.org/drawingml/2006/diagram" xmlns:c="http://schemas.openxmlformats.org/drawingml/2006/chart" xmlns:mv="urn:schemas-microsoft-com:mac:vml" xmlns:mc="http://schemas.openxmlformats.org/markup-compatibility/2006" xmlns="" r:id="rId41" roundtripDataSignature="AMtx7mj558g+zs1o7BnEogSEStSFHJZ7WA=="/>
     </p:ext>
   </p:extLst>
 </p:presentation>
@@ -14321,7 +14321,7 @@
         <p:fade/>
       </p:transition>
     </mc:Choice>
-    <mc:Fallback xmlns="" xmlns:mv="urn:schemas-microsoft-com:mac:vml" xmlns:c="http://schemas.openxmlformats.org/drawingml/2006/chart" xmlns:dgm="http://schemas.openxmlformats.org/drawingml/2006/diagram" xmlns:o="urn:schemas-microsoft-com:office:office" xmlns:v="urn:schemas-microsoft-com:vml" xmlns:pvml="urn:schemas-microsoft-com:office:powerpoint" xmlns:com="http://schemas.openxmlformats.org/drawingml/2006/compatibility" xmlns:p15="http://schemas.microsoft.com/office/powerpoint/2012/main" xmlns:ahyp="http://schemas.microsoft.com/office/drawing/2018/hyperlinkcolor">
+    <mc:Fallback xmlns:ahyp="http://schemas.microsoft.com/office/drawing/2018/hyperlinkcolor" xmlns:p15="http://schemas.microsoft.com/office/powerpoint/2012/main" xmlns:com="http://schemas.openxmlformats.org/drawingml/2006/compatibility" xmlns:pvml="urn:schemas-microsoft-com:office:powerpoint" xmlns:v="urn:schemas-microsoft-com:vml" xmlns:o="urn:schemas-microsoft-com:office:office" xmlns:dgm="http://schemas.openxmlformats.org/drawingml/2006/diagram" xmlns:c="http://schemas.openxmlformats.org/drawingml/2006/chart" xmlns:mv="urn:schemas-microsoft-com:mac:vml" xmlns="">
       <p:transition spd="slow">
         <p:fade/>
       </p:transition>
@@ -17236,7 +17236,7 @@
         </p:blipFill>
         <p:spPr>
           <a:xfrm>
-            <a:off x="1259093" y="2258726"/>
+            <a:off x="1253532" y="4136599"/>
             <a:ext cx="6636990" cy="1292543"/>
           </a:xfrm>
           <a:prstGeom prst="rect">
@@ -17244,6 +17244,198 @@
           </a:prstGeom>
         </p:spPr>
       </p:pic>
+      <p:sp>
+        <p:nvSpPr>
+          <p:cNvPr id="2" name="TextBox 1"/>
+          <p:cNvSpPr txBox="1"/>
+          <p:nvPr/>
+        </p:nvSpPr>
+        <p:spPr>
+          <a:xfrm>
+            <a:off x="1953066" y="5474379"/>
+            <a:ext cx="5729882" cy="307777"/>
+          </a:xfrm>
+          <a:prstGeom prst="rect">
+            <a:avLst/>
+          </a:prstGeom>
+          <a:noFill/>
+        </p:spPr>
+        <p:txBody>
+          <a:bodyPr wrap="square" rtlCol="0">
+            <a:spAutoFit/>
+          </a:bodyPr>
+          <a:lstStyle/>
+          <a:p>
+            <a:r>
+              <a:rPr lang="en-US" i="1" dirty="0" smtClean="0"/>
+              <a:t>Hard-code </a:t>
+            </a:r>
+            <a:r>
+              <a:rPr lang="en-US" i="1" dirty="0" err="1" smtClean="0"/>
+              <a:t>danh</a:t>
+            </a:r>
+            <a:r>
+              <a:rPr lang="en-US" i="1" dirty="0" smtClean="0"/>
+              <a:t> </a:t>
+            </a:r>
+            <a:r>
+              <a:rPr lang="en-US" i="1" dirty="0" err="1" smtClean="0"/>
+              <a:t>sách</a:t>
+            </a:r>
+            <a:r>
+              <a:rPr lang="en-US" i="1" dirty="0" smtClean="0"/>
+              <a:t> </a:t>
+            </a:r>
+            <a:r>
+              <a:rPr lang="en-US" i="1" dirty="0" err="1" smtClean="0"/>
+              <a:t>loại</a:t>
+            </a:r>
+            <a:r>
+              <a:rPr lang="en-US" i="1" dirty="0" smtClean="0"/>
+              <a:t> Media </a:t>
+            </a:r>
+            <a:r>
+              <a:rPr lang="en-US" i="1" dirty="0" err="1" smtClean="0"/>
+              <a:t>trong</a:t>
+            </a:r>
+            <a:r>
+              <a:rPr lang="en-US" i="1" dirty="0" smtClean="0"/>
+              <a:t> class </a:t>
+            </a:r>
+            <a:r>
+              <a:rPr lang="en-US" i="1" dirty="0" err="1" smtClean="0"/>
+              <a:t>HomeScreenHandler</a:t>
+            </a:r>
+            <a:endParaRPr lang="en-US" i="1" dirty="0"/>
+          </a:p>
+        </p:txBody>
+      </p:sp>
+      <p:pic>
+        <p:nvPicPr>
+          <p:cNvPr id="4" name="Picture 3"/>
+          <p:cNvPicPr>
+            <a:picLocks noChangeAspect="1"/>
+          </p:cNvPicPr>
+          <p:nvPr/>
+        </p:nvPicPr>
+        <p:blipFill>
+          <a:blip r:embed="rId4"/>
+          <a:stretch>
+            <a:fillRect/>
+          </a:stretch>
+        </p:blipFill>
+        <p:spPr>
+          <a:xfrm>
+            <a:off x="1253532" y="2072733"/>
+            <a:ext cx="2707170" cy="1841763"/>
+          </a:xfrm>
+          <a:prstGeom prst="rect">
+            <a:avLst/>
+          </a:prstGeom>
+        </p:spPr>
+      </p:pic>
+      <p:sp>
+        <p:nvSpPr>
+          <p:cNvPr id="8" name="TextBox 7"/>
+          <p:cNvSpPr txBox="1"/>
+          <p:nvPr/>
+        </p:nvSpPr>
+        <p:spPr>
+          <a:xfrm>
+            <a:off x="4060093" y="3391276"/>
+            <a:ext cx="3622855" cy="523220"/>
+          </a:xfrm>
+          <a:prstGeom prst="rect">
+            <a:avLst/>
+          </a:prstGeom>
+          <a:noFill/>
+        </p:spPr>
+        <p:txBody>
+          <a:bodyPr wrap="square" rtlCol="0">
+            <a:spAutoFit/>
+          </a:bodyPr>
+          <a:lstStyle/>
+          <a:p>
+            <a:r>
+              <a:rPr lang="en-US" i="1" dirty="0" err="1" smtClean="0"/>
+              <a:t>Chức</a:t>
+            </a:r>
+            <a:r>
+              <a:rPr lang="en-US" i="1" dirty="0" smtClean="0"/>
+              <a:t> </a:t>
+            </a:r>
+            <a:r>
+              <a:rPr lang="en-US" i="1" dirty="0" err="1" smtClean="0"/>
+              <a:t>năng</a:t>
+            </a:r>
+            <a:r>
+              <a:rPr lang="en-US" i="1" dirty="0" smtClean="0"/>
+              <a:t> </a:t>
+            </a:r>
+            <a:r>
+              <a:rPr lang="en-US" i="1" dirty="0" err="1" smtClean="0"/>
+              <a:t>tìm</a:t>
+            </a:r>
+            <a:r>
+              <a:rPr lang="en-US" i="1" dirty="0" smtClean="0"/>
+              <a:t> </a:t>
+            </a:r>
+            <a:r>
+              <a:rPr lang="en-US" i="1" dirty="0" err="1" smtClean="0"/>
+              <a:t>kiếm</a:t>
+            </a:r>
+            <a:r>
+              <a:rPr lang="en-US" i="1" dirty="0" smtClean="0"/>
+              <a:t> </a:t>
+            </a:r>
+            <a:r>
+              <a:rPr lang="en-US" i="1" dirty="0" err="1" smtClean="0"/>
+              <a:t>theo</a:t>
+            </a:r>
+            <a:r>
+              <a:rPr lang="en-US" i="1" dirty="0" smtClean="0"/>
+              <a:t> </a:t>
+            </a:r>
+            <a:r>
+              <a:rPr lang="en-US" i="1" dirty="0" err="1" smtClean="0"/>
+              <a:t>từng</a:t>
+            </a:r>
+            <a:r>
+              <a:rPr lang="en-US" i="1" dirty="0" smtClean="0"/>
+              <a:t> </a:t>
+            </a:r>
+            <a:r>
+              <a:rPr lang="en-US" i="1" dirty="0" err="1" smtClean="0"/>
+              <a:t>loại</a:t>
+            </a:r>
+            <a:r>
+              <a:rPr lang="en-US" i="1" dirty="0" smtClean="0"/>
+              <a:t> Media </a:t>
+            </a:r>
+            <a:r>
+              <a:rPr lang="en-US" i="1" dirty="0" err="1" smtClean="0"/>
+              <a:t>trên</a:t>
+            </a:r>
+            <a:r>
+              <a:rPr lang="en-US" i="1" dirty="0" smtClean="0"/>
+              <a:t> </a:t>
+            </a:r>
+            <a:r>
+              <a:rPr lang="en-US" i="1" dirty="0" err="1" smtClean="0"/>
+              <a:t>giao</a:t>
+            </a:r>
+            <a:r>
+              <a:rPr lang="en-US" i="1" dirty="0" smtClean="0"/>
+              <a:t> </a:t>
+            </a:r>
+            <a:r>
+              <a:rPr lang="en-US" i="1" dirty="0" err="1" smtClean="0"/>
+              <a:t>diện</a:t>
+            </a:r>
+            <a:endParaRPr lang="en-US" i="1" dirty="0"/>
+          </a:p>
+        </p:txBody>
+      </p:sp>
     </p:spTree>
     <p:extLst>
       <p:ext uri="{BB962C8B-B14F-4D97-AF65-F5344CB8AC3E}">
@@ -17669,7 +17861,7 @@
         </p:nvSpPr>
         <p:spPr>
           <a:xfrm>
-            <a:off x="3824612" y="4738256"/>
+            <a:off x="3824612" y="6077322"/>
             <a:ext cx="1438214" cy="307777"/>
           </a:xfrm>
           <a:prstGeom prst="rect">
@@ -17684,40 +17876,40 @@
           <a:lstStyle/>
           <a:p>
             <a:r>
-              <a:rPr lang="en-US" dirty="0" err="1"/>
+              <a:rPr lang="en-US" i="1" dirty="0" err="1"/>
               <a:t>Thiết</a:t>
             </a:r>
             <a:r>
-              <a:rPr lang="en-US" dirty="0"/>
-              <a:t> </a:t>
-            </a:r>
-            <a:r>
-              <a:rPr lang="en-US" dirty="0" err="1"/>
+              <a:rPr lang="en-US" i="1" dirty="0"/>
+              <a:t> </a:t>
+            </a:r>
+            <a:r>
+              <a:rPr lang="en-US" i="1" dirty="0" err="1"/>
               <a:t>kế</a:t>
             </a:r>
             <a:r>
-              <a:rPr lang="en-US" dirty="0"/>
-              <a:t> </a:t>
-            </a:r>
-            <a:r>
-              <a:rPr lang="en-US" dirty="0" err="1"/>
+              <a:rPr lang="en-US" i="1" dirty="0"/>
+              <a:t> </a:t>
+            </a:r>
+            <a:r>
+              <a:rPr lang="en-US" i="1" dirty="0" err="1"/>
               <a:t>cải</a:t>
             </a:r>
             <a:r>
-              <a:rPr lang="en-US" dirty="0"/>
-              <a:t> </a:t>
-            </a:r>
-            <a:r>
-              <a:rPr lang="en-US" dirty="0" err="1"/>
+              <a:rPr lang="en-US" i="1" dirty="0"/>
+              <a:t> </a:t>
+            </a:r>
+            <a:r>
+              <a:rPr lang="en-US" i="1" dirty="0" err="1"/>
               <a:t>tiến</a:t>
             </a:r>
-            <a:endParaRPr lang="en-US" dirty="0"/>
+            <a:endParaRPr lang="en-US" i="1" dirty="0"/>
           </a:p>
         </p:txBody>
       </p:sp>
       <p:pic>
         <p:nvPicPr>
-          <p:cNvPr id="8" name="Picture 7" descr="Diagram&#10;&#10;Description automatically generated">
+          <p:cNvPr id="8" name="Picture 7">
             <a:extLst>
               <a:ext uri="{FF2B5EF4-FFF2-40B4-BE49-F238E27FC236}">
                 <a16:creationId xmlns:a16="http://schemas.microsoft.com/office/drawing/2014/main" id="{2F96D2B6-BE22-D46E-3C09-018BE4D313C3}"/>
@@ -17743,8 +17935,8 @@
         </p:blipFill>
         <p:spPr>
           <a:xfrm>
-            <a:off x="1600200" y="2191702"/>
-            <a:ext cx="5943600" cy="2474595"/>
+            <a:off x="821496" y="2004287"/>
+            <a:ext cx="7444445" cy="3965308"/>
           </a:xfrm>
           <a:prstGeom prst="rect">
             <a:avLst/>
@@ -18221,7 +18413,7 @@
           <a:lstStyle/>
           <a:p>
             <a:r>
-              <a:rPr lang="en-US" dirty="0"/>
+              <a:rPr lang="en-US" i="1" dirty="0"/>
               <a:t>Java Reflections</a:t>
             </a:r>
           </a:p>
@@ -18727,19 +18919,19 @@
           <a:lstStyle/>
           <a:p>
             <a:r>
-              <a:rPr lang="en-US" dirty="0" err="1"/>
+              <a:rPr lang="en-US" i="1" dirty="0" err="1"/>
               <a:t>Cài</a:t>
             </a:r>
             <a:r>
-              <a:rPr lang="en-US" dirty="0"/>
-              <a:t> </a:t>
-            </a:r>
-            <a:r>
-              <a:rPr lang="en-US" dirty="0" err="1"/>
+              <a:rPr lang="en-US" i="1" dirty="0"/>
+              <a:t> </a:t>
+            </a:r>
+            <a:r>
+              <a:rPr lang="en-US" i="1" dirty="0" err="1"/>
               <a:t>đặt</a:t>
             </a:r>
             <a:r>
-              <a:rPr lang="en-US" dirty="0"/>
+              <a:rPr lang="en-US" i="1" dirty="0"/>
               <a:t> Java Annotation @DisplayName</a:t>
             </a:r>
           </a:p>
@@ -18774,26 +18966,26 @@
           <a:lstStyle/>
           <a:p>
             <a:r>
-              <a:rPr lang="en-US" dirty="0" err="1"/>
+              <a:rPr lang="en-US" i="1" dirty="0" err="1"/>
               <a:t>Sử</a:t>
             </a:r>
             <a:r>
-              <a:rPr lang="en-US" dirty="0"/>
-              <a:t> </a:t>
-            </a:r>
-            <a:r>
-              <a:rPr lang="en-US" dirty="0" err="1"/>
+              <a:rPr lang="en-US" i="1" dirty="0"/>
+              <a:t> </a:t>
+            </a:r>
+            <a:r>
+              <a:rPr lang="en-US" i="1" dirty="0" err="1"/>
               <a:t>dụng</a:t>
             </a:r>
             <a:r>
-              <a:rPr lang="en-US" dirty="0"/>
+              <a:rPr lang="en-US" i="1" dirty="0"/>
               <a:t> Java </a:t>
             </a:r>
             <a:r>
-              <a:rPr lang="en-US" dirty="0" err="1"/>
+              <a:rPr lang="en-US" i="1" dirty="0" err="1"/>
               <a:t>Anotation</a:t>
             </a:r>
-            <a:endParaRPr lang="en-US" dirty="0"/>
+            <a:endParaRPr lang="en-US" i="1" dirty="0"/>
           </a:p>
         </p:txBody>
       </p:sp>
@@ -19430,7 +19622,7 @@
       </p:sp>
       <p:pic>
         <p:nvPicPr>
-          <p:cNvPr id="13" name="Picture 12" descr="A picture containing table&#10;&#10;Description automatically generated">
+          <p:cNvPr id="13" name="Picture 12">
             <a:extLst>
               <a:ext uri="{FF2B5EF4-FFF2-40B4-BE49-F238E27FC236}">
                 <a16:creationId xmlns:a16="http://schemas.microsoft.com/office/drawing/2014/main" id="{267502CD-A561-C062-ACF9-6E899A6AD573}"/>
@@ -19443,7 +19635,7 @@
           <p:nvPr/>
         </p:nvPicPr>
         <p:blipFill>
-          <a:blip r:embed="rId3" cstate="print">
+          <a:blip r:embed="rId3">
             <a:extLst>
               <a:ext uri="{28A0092B-C50C-407E-A947-70E740481C1C}">
                 <a14:useLocalDpi xmlns:a14="http://schemas.microsoft.com/office/drawing/2010/main" val="0"/>
@@ -19456,8 +19648,8 @@
         </p:blipFill>
         <p:spPr>
           <a:xfrm>
-            <a:off x="707059" y="2296490"/>
-            <a:ext cx="7729882" cy="3895497"/>
+            <a:off x="717401" y="2296490"/>
+            <a:ext cx="7709198" cy="3895497"/>
           </a:xfrm>
           <a:prstGeom prst="rect">
             <a:avLst/>
@@ -23710,7 +23902,7 @@
       </p:sp>
       <p:pic>
         <p:nvPicPr>
-          <p:cNvPr id="6" name="Picture 5" descr="Diagram&#10;&#10;Description automatically generated">
+          <p:cNvPr id="6" name="Picture 5">
             <a:extLst>
               <a:ext uri="{FF2B5EF4-FFF2-40B4-BE49-F238E27FC236}">
                 <a16:creationId xmlns:a16="http://schemas.microsoft.com/office/drawing/2014/main" id="{0F5817B0-0FBD-1298-5990-67F7DBA6F49F}"/>
@@ -23723,7 +23915,7 @@
           <p:nvPr/>
         </p:nvPicPr>
         <p:blipFill>
-          <a:blip r:embed="rId3" cstate="print">
+          <a:blip r:embed="rId3">
             <a:extLst>
               <a:ext uri="{28A0092B-C50C-407E-A947-70E740481C1C}">
                 <a14:useLocalDpi xmlns:a14="http://schemas.microsoft.com/office/drawing/2010/main" val="0"/>
@@ -23736,8 +23928,8 @@
         </p:blipFill>
         <p:spPr>
           <a:xfrm>
-            <a:off x="512064" y="683280"/>
-            <a:ext cx="8412719" cy="6174720"/>
+            <a:off x="512455" y="683280"/>
+            <a:ext cx="8411937" cy="6174720"/>
           </a:xfrm>
           <a:prstGeom prst="rect">
             <a:avLst/>
@@ -24180,7 +24372,7 @@
       </p:sp>
       <p:pic>
         <p:nvPicPr>
-          <p:cNvPr id="8" name="Picture 7" descr="Diagram&#10;&#10;Description automatically generated">
+          <p:cNvPr id="8" name="Picture 7">
             <a:extLst>
               <a:ext uri="{FF2B5EF4-FFF2-40B4-BE49-F238E27FC236}">
                 <a16:creationId xmlns:a16="http://schemas.microsoft.com/office/drawing/2014/main" id="{C24A0CA2-9A8B-D95A-28CC-40006FFCA998}"/>
@@ -24193,7 +24385,7 @@
           <p:nvPr/>
         </p:nvPicPr>
         <p:blipFill>
-          <a:blip r:embed="rId3" cstate="print">
+          <a:blip r:embed="rId3">
             <a:extLst>
               <a:ext uri="{28A0092B-C50C-407E-A947-70E740481C1C}">
                 <a14:useLocalDpi xmlns:a14="http://schemas.microsoft.com/office/drawing/2010/main" val="0"/>
@@ -24206,8 +24398,8 @@
         </p:blipFill>
         <p:spPr>
           <a:xfrm>
-            <a:off x="0" y="783271"/>
-            <a:ext cx="9144000" cy="5449277"/>
+            <a:off x="0" y="783461"/>
+            <a:ext cx="9144000" cy="5448897"/>
           </a:xfrm>
           <a:prstGeom prst="rect">
             <a:avLst/>
@@ -27926,7 +28118,7 @@
       </p:sp>
       <p:pic>
         <p:nvPicPr>
-          <p:cNvPr id="8" name="Picture 7" descr="Diagram&#10;&#10;Description automatically generated">
+          <p:cNvPr id="8" name="Picture 7">
             <a:extLst>
               <a:ext uri="{FF2B5EF4-FFF2-40B4-BE49-F238E27FC236}">
                 <a16:creationId xmlns:a16="http://schemas.microsoft.com/office/drawing/2014/main" id="{894957AE-9054-0B9C-0594-4B0532F86D1B}"/>
@@ -27939,7 +28131,7 @@
           <p:nvPr/>
         </p:nvPicPr>
         <p:blipFill>
-          <a:blip r:embed="rId3" cstate="print">
+          <a:blip r:embed="rId3">
             <a:extLst>
               <a:ext uri="{28A0092B-C50C-407E-A947-70E740481C1C}">
                 <a14:useLocalDpi xmlns:a14="http://schemas.microsoft.com/office/drawing/2010/main" val="0"/>
@@ -27952,8 +28144,8 @@
         </p:blipFill>
         <p:spPr>
           <a:xfrm>
-            <a:off x="1" y="2294409"/>
-            <a:ext cx="9147446" cy="2469615"/>
+            <a:off x="187" y="2294409"/>
+            <a:ext cx="9147073" cy="2469615"/>
           </a:xfrm>
           <a:prstGeom prst="rect">
             <a:avLst/>
@@ -30671,34 +30863,34 @@
           <a:p>
             <a:pPr algn="ctr"/>
             <a:r>
-              <a:rPr lang="en-US" sz="1600" dirty="0" err="1"/>
+              <a:rPr lang="en-US" sz="1600" i="1" dirty="0" err="1"/>
               <a:t>Biểu</a:t>
             </a:r>
             <a:r>
-              <a:rPr lang="en-US" sz="1600" dirty="0"/>
-              <a:t> </a:t>
-            </a:r>
-            <a:r>
-              <a:rPr lang="en-US" sz="1600" dirty="0" err="1"/>
+              <a:rPr lang="en-US" sz="1600" i="1" dirty="0"/>
+              <a:t> </a:t>
+            </a:r>
+            <a:r>
+              <a:rPr lang="en-US" sz="1600" i="1" dirty="0" err="1"/>
               <a:t>đồ</a:t>
             </a:r>
             <a:r>
-              <a:rPr lang="en-US" sz="1600" dirty="0"/>
+              <a:rPr lang="en-US" sz="1600" i="1" dirty="0"/>
               <a:t> use case </a:t>
             </a:r>
             <a:r>
-              <a:rPr lang="en-US" sz="1600" dirty="0" err="1"/>
+              <a:rPr lang="en-US" sz="1600" i="1" dirty="0" err="1"/>
               <a:t>tổng</a:t>
             </a:r>
             <a:r>
-              <a:rPr lang="en-US" sz="1600" dirty="0"/>
-              <a:t> </a:t>
-            </a:r>
-            <a:r>
-              <a:rPr lang="en-US" sz="1600" dirty="0" err="1"/>
+              <a:rPr lang="en-US" sz="1600" i="1" dirty="0"/>
+              <a:t> </a:t>
+            </a:r>
+            <a:r>
+              <a:rPr lang="en-US" sz="1600" i="1" dirty="0" err="1"/>
               <a:t>quan</a:t>
             </a:r>
-            <a:endParaRPr lang="en-US" sz="1600" dirty="0"/>
+            <a:endParaRPr lang="en-US" sz="1600" i="1" dirty="0"/>
           </a:p>
         </p:txBody>
       </p:sp>

</xml_diff>

<commit_message>
modify: sửa lỗi chính tả
</commit_message>
<xml_diff>
--- a/presentation/Design_Pattern_Slide.pptx
+++ b/presentation/Design_Pattern_Slide.pptx
@@ -43,14 +43,14 @@
   <p:notesSz cx="6858000" cy="9144000"/>
   <p:embeddedFontLst>
     <p:embeddedFont>
-      <p:font typeface="Calibri" panose="020F0502020204030204" pitchFamily="34" charset="0"/>
+      <p:font typeface="Lato" panose="020B0604020202020204" charset="0"/>
       <p:regular r:id="rId33"/>
       <p:bold r:id="rId34"/>
       <p:italic r:id="rId35"/>
       <p:boldItalic r:id="rId36"/>
     </p:embeddedFont>
     <p:embeddedFont>
-      <p:font typeface="Lato" panose="020B0604020202020204" charset="0"/>
+      <p:font typeface="Calibri" panose="020F0502020204030204" pitchFamily="34" charset="0"/>
       <p:regular r:id="rId37"/>
       <p:bold r:id="rId38"/>
       <p:italic r:id="rId39"/>
@@ -291,7 +291,7 @@
       <p15:sldGuideLst xmlns:p15="http://schemas.microsoft.com/office/powerpoint/2012/main"/>
     </p:ext>
     <p:ext uri="http://customooxmlschemas.google.com/">
-      <go:slidesCustomData xmlns:go="http://customooxmlschemas.google.com/" xmlns:ahyp="http://schemas.microsoft.com/office/drawing/2018/hyperlinkcolor" xmlns:p15="http://schemas.microsoft.com/office/powerpoint/2012/main" xmlns:p14="http://schemas.microsoft.com/office/powerpoint/2010/main" xmlns:com="http://schemas.openxmlformats.org/drawingml/2006/compatibility" xmlns:pvml="urn:schemas-microsoft-com:office:powerpoint" xmlns:v="urn:schemas-microsoft-com:vml" xmlns:o="urn:schemas-microsoft-com:office:office" xmlns:dgm="http://schemas.openxmlformats.org/drawingml/2006/diagram" xmlns:c="http://schemas.openxmlformats.org/drawingml/2006/chart" xmlns:mv="urn:schemas-microsoft-com:mac:vml" xmlns:mc="http://schemas.openxmlformats.org/markup-compatibility/2006" xmlns="" r:id="rId41" roundtripDataSignature="AMtx7mj558g+zs1o7BnEogSEStSFHJZ7WA=="/>
+      <go:slidesCustomData xmlns="" xmlns:mc="http://schemas.openxmlformats.org/markup-compatibility/2006" xmlns:mv="urn:schemas-microsoft-com:mac:vml" xmlns:c="http://schemas.openxmlformats.org/drawingml/2006/chart" xmlns:dgm="http://schemas.openxmlformats.org/drawingml/2006/diagram" xmlns:o="urn:schemas-microsoft-com:office:office" xmlns:v="urn:schemas-microsoft-com:vml" xmlns:pvml="urn:schemas-microsoft-com:office:powerpoint" xmlns:com="http://schemas.openxmlformats.org/drawingml/2006/compatibility" xmlns:p14="http://schemas.microsoft.com/office/powerpoint/2010/main" xmlns:p15="http://schemas.microsoft.com/office/powerpoint/2012/main" xmlns:ahyp="http://schemas.microsoft.com/office/drawing/2018/hyperlinkcolor" xmlns:go="http://customooxmlschemas.google.com/" r:id="rId41" roundtripDataSignature="AMtx7mj558g+zs1o7BnEogSEStSFHJZ7WA=="/>
     </p:ext>
   </p:extLst>
 </p:presentation>
@@ -14321,7 +14321,7 @@
         <p:fade/>
       </p:transition>
     </mc:Choice>
-    <mc:Fallback xmlns:ahyp="http://schemas.microsoft.com/office/drawing/2018/hyperlinkcolor" xmlns:p15="http://schemas.microsoft.com/office/powerpoint/2012/main" xmlns:com="http://schemas.openxmlformats.org/drawingml/2006/compatibility" xmlns:pvml="urn:schemas-microsoft-com:office:powerpoint" xmlns:v="urn:schemas-microsoft-com:vml" xmlns:o="urn:schemas-microsoft-com:office:office" xmlns:dgm="http://schemas.openxmlformats.org/drawingml/2006/diagram" xmlns:c="http://schemas.openxmlformats.org/drawingml/2006/chart" xmlns:mv="urn:schemas-microsoft-com:mac:vml" xmlns="">
+    <mc:Fallback xmlns="" xmlns:mv="urn:schemas-microsoft-com:mac:vml" xmlns:c="http://schemas.openxmlformats.org/drawingml/2006/chart" xmlns:dgm="http://schemas.openxmlformats.org/drawingml/2006/diagram" xmlns:o="urn:schemas-microsoft-com:office:office" xmlns:v="urn:schemas-microsoft-com:vml" xmlns:pvml="urn:schemas-microsoft-com:office:powerpoint" xmlns:com="http://schemas.openxmlformats.org/drawingml/2006/compatibility" xmlns:p15="http://schemas.microsoft.com/office/powerpoint/2012/main" xmlns:ahyp="http://schemas.microsoft.com/office/drawing/2018/hyperlinkcolor">
       <p:transition spd="slow">
         <p:fade/>
       </p:transition>
@@ -15284,7 +15284,23 @@
                   <a:schemeClr val="tx1"/>
                 </a:solidFill>
               </a:rPr>
-              <a:t>3.4.1. Clear name</a:t>
+              <a:t>3.4.1. </a:t>
+            </a:r>
+            <a:r>
+              <a:rPr lang="en-US" sz="1600" b="1" smtClean="0">
+                <a:solidFill>
+                  <a:schemeClr val="tx1"/>
+                </a:solidFill>
+              </a:rPr>
+              <a:t>Clean </a:t>
+            </a:r>
+            <a:r>
+              <a:rPr lang="en-US" sz="1600" b="1" dirty="0">
+                <a:solidFill>
+                  <a:schemeClr val="tx1"/>
+                </a:solidFill>
+              </a:rPr>
+              <a:t>name</a:t>
             </a:r>
           </a:p>
           <a:p>

</xml_diff>

<commit_message>
update slide for presentation
</commit_message>
<xml_diff>
--- a/presentation/Design_Pattern_Slide.pptx
+++ b/presentation/Design_Pattern_Slide.pptx
@@ -43,14 +43,14 @@
   <p:notesSz cx="6858000" cy="9144000"/>
   <p:embeddedFontLst>
     <p:embeddedFont>
-      <p:font typeface="Lato" panose="020B0604020202020204" charset="0"/>
+      <p:font typeface="Calibri" panose="020F0502020204030204" pitchFamily="34" charset="0"/>
       <p:regular r:id="rId33"/>
       <p:bold r:id="rId34"/>
       <p:italic r:id="rId35"/>
       <p:boldItalic r:id="rId36"/>
     </p:embeddedFont>
     <p:embeddedFont>
-      <p:font typeface="Calibri" panose="020F0502020204030204" pitchFamily="34" charset="0"/>
+      <p:font typeface="Lato" panose="020F0502020204030203" pitchFamily="34" charset="0"/>
       <p:regular r:id="rId37"/>
       <p:bold r:id="rId38"/>
       <p:italic r:id="rId39"/>
@@ -291,7 +291,7 @@
       <p15:sldGuideLst xmlns:p15="http://schemas.microsoft.com/office/powerpoint/2012/main"/>
     </p:ext>
     <p:ext uri="http://customooxmlschemas.google.com/">
-      <go:slidesCustomData xmlns="" xmlns:mc="http://schemas.openxmlformats.org/markup-compatibility/2006" xmlns:mv="urn:schemas-microsoft-com:mac:vml" xmlns:c="http://schemas.openxmlformats.org/drawingml/2006/chart" xmlns:dgm="http://schemas.openxmlformats.org/drawingml/2006/diagram" xmlns:o="urn:schemas-microsoft-com:office:office" xmlns:v="urn:schemas-microsoft-com:vml" xmlns:pvml="urn:schemas-microsoft-com:office:powerpoint" xmlns:com="http://schemas.openxmlformats.org/drawingml/2006/compatibility" xmlns:p14="http://schemas.microsoft.com/office/powerpoint/2010/main" xmlns:p15="http://schemas.microsoft.com/office/powerpoint/2012/main" xmlns:ahyp="http://schemas.microsoft.com/office/drawing/2018/hyperlinkcolor" xmlns:go="http://customooxmlschemas.google.com/" r:id="rId41" roundtripDataSignature="AMtx7mj558g+zs1o7BnEogSEStSFHJZ7WA=="/>
+      <go:slidesCustomData xmlns:go="http://customooxmlschemas.google.com/" xmlns:ahyp="http://schemas.microsoft.com/office/drawing/2018/hyperlinkcolor" xmlns:p15="http://schemas.microsoft.com/office/powerpoint/2012/main" xmlns:p14="http://schemas.microsoft.com/office/powerpoint/2010/main" xmlns:com="http://schemas.openxmlformats.org/drawingml/2006/compatibility" xmlns:pvml="urn:schemas-microsoft-com:office:powerpoint" xmlns:v="urn:schemas-microsoft-com:vml" xmlns:o="urn:schemas-microsoft-com:office:office" xmlns:dgm="http://schemas.openxmlformats.org/drawingml/2006/diagram" xmlns:c="http://schemas.openxmlformats.org/drawingml/2006/chart" xmlns:mv="urn:schemas-microsoft-com:mac:vml" xmlns:mc="http://schemas.openxmlformats.org/markup-compatibility/2006" xmlns="" r:id="rId41" roundtripDataSignature="AMtx7mj558g+zs1o7BnEogSEStSFHJZ7WA=="/>
     </p:ext>
   </p:extLst>
 </p:presentation>
@@ -300,7 +300,7 @@
 <file path=ppt/revisionInfo.xml><?xml version="1.0" encoding="utf-8"?>
 <p1510:revInfo xmlns:a="http://schemas.openxmlformats.org/drawingml/2006/main" xmlns:r="http://schemas.openxmlformats.org/officeDocument/2006/relationships" xmlns:p1510="http://schemas.microsoft.com/office/powerpoint/2015/10/main">
   <p1510:revLst>
-    <p1510:client id="{2446296F-6001-4EFA-AEF4-39D79D63D49A}" v="59" dt="2022-07-10T16:05:19.429"/>
+    <p1510:client id="{2446296F-6001-4EFA-AEF4-39D79D63D49A}" v="62" dt="2022-07-11T11:07:12.540"/>
   </p1510:revLst>
 </p1510:revInfo>
 </file>
@@ -14321,7 +14321,7 @@
         <p:fade/>
       </p:transition>
     </mc:Choice>
-    <mc:Fallback xmlns="" xmlns:mv="urn:schemas-microsoft-com:mac:vml" xmlns:c="http://schemas.openxmlformats.org/drawingml/2006/chart" xmlns:dgm="http://schemas.openxmlformats.org/drawingml/2006/diagram" xmlns:o="urn:schemas-microsoft-com:office:office" xmlns:v="urn:schemas-microsoft-com:vml" xmlns:pvml="urn:schemas-microsoft-com:office:powerpoint" xmlns:com="http://schemas.openxmlformats.org/drawingml/2006/compatibility" xmlns:p15="http://schemas.microsoft.com/office/powerpoint/2012/main" xmlns:ahyp="http://schemas.microsoft.com/office/drawing/2018/hyperlinkcolor">
+    <mc:Fallback xmlns:ahyp="http://schemas.microsoft.com/office/drawing/2018/hyperlinkcolor" xmlns:p15="http://schemas.microsoft.com/office/powerpoint/2012/main" xmlns:com="http://schemas.openxmlformats.org/drawingml/2006/compatibility" xmlns:pvml="urn:schemas-microsoft-com:office:powerpoint" xmlns:v="urn:schemas-microsoft-com:vml" xmlns:o="urn:schemas-microsoft-com:office:office" xmlns:dgm="http://schemas.openxmlformats.org/drawingml/2006/diagram" xmlns:c="http://schemas.openxmlformats.org/drawingml/2006/chart" xmlns:mv="urn:schemas-microsoft-com:mac:vml" xmlns="">
       <p:transition spd="slow">
         <p:fade/>
       </p:transition>
@@ -15284,23 +15284,7 @@
                   <a:schemeClr val="tx1"/>
                 </a:solidFill>
               </a:rPr>
-              <a:t>3.4.1. </a:t>
-            </a:r>
-            <a:r>
-              <a:rPr lang="en-US" sz="1600" b="1" smtClean="0">
-                <a:solidFill>
-                  <a:schemeClr val="tx1"/>
-                </a:solidFill>
-              </a:rPr>
-              <a:t>Clean </a:t>
-            </a:r>
-            <a:r>
-              <a:rPr lang="en-US" sz="1600" b="1" dirty="0">
-                <a:solidFill>
-                  <a:schemeClr val="tx1"/>
-                </a:solidFill>
-              </a:rPr>
-              <a:t>name</a:t>
+              <a:t>3.4.1. Clear name</a:t>
             </a:r>
           </a:p>
           <a:p>
@@ -17252,7 +17236,7 @@
         </p:blipFill>
         <p:spPr>
           <a:xfrm>
-            <a:off x="1253532" y="4136599"/>
+            <a:off x="1259093" y="2258726"/>
             <a:ext cx="6636990" cy="1292543"/>
           </a:xfrm>
           <a:prstGeom prst="rect">
@@ -17260,198 +17244,6 @@
           </a:prstGeom>
         </p:spPr>
       </p:pic>
-      <p:sp>
-        <p:nvSpPr>
-          <p:cNvPr id="2" name="TextBox 1"/>
-          <p:cNvSpPr txBox="1"/>
-          <p:nvPr/>
-        </p:nvSpPr>
-        <p:spPr>
-          <a:xfrm>
-            <a:off x="1953066" y="5474379"/>
-            <a:ext cx="5729882" cy="307777"/>
-          </a:xfrm>
-          <a:prstGeom prst="rect">
-            <a:avLst/>
-          </a:prstGeom>
-          <a:noFill/>
-        </p:spPr>
-        <p:txBody>
-          <a:bodyPr wrap="square" rtlCol="0">
-            <a:spAutoFit/>
-          </a:bodyPr>
-          <a:lstStyle/>
-          <a:p>
-            <a:r>
-              <a:rPr lang="en-US" i="1" dirty="0" smtClean="0"/>
-              <a:t>Hard-code </a:t>
-            </a:r>
-            <a:r>
-              <a:rPr lang="en-US" i="1" dirty="0" err="1" smtClean="0"/>
-              <a:t>danh</a:t>
-            </a:r>
-            <a:r>
-              <a:rPr lang="en-US" i="1" dirty="0" smtClean="0"/>
-              <a:t> </a:t>
-            </a:r>
-            <a:r>
-              <a:rPr lang="en-US" i="1" dirty="0" err="1" smtClean="0"/>
-              <a:t>sách</a:t>
-            </a:r>
-            <a:r>
-              <a:rPr lang="en-US" i="1" dirty="0" smtClean="0"/>
-              <a:t> </a:t>
-            </a:r>
-            <a:r>
-              <a:rPr lang="en-US" i="1" dirty="0" err="1" smtClean="0"/>
-              <a:t>loại</a:t>
-            </a:r>
-            <a:r>
-              <a:rPr lang="en-US" i="1" dirty="0" smtClean="0"/>
-              <a:t> Media </a:t>
-            </a:r>
-            <a:r>
-              <a:rPr lang="en-US" i="1" dirty="0" err="1" smtClean="0"/>
-              <a:t>trong</a:t>
-            </a:r>
-            <a:r>
-              <a:rPr lang="en-US" i="1" dirty="0" smtClean="0"/>
-              <a:t> class </a:t>
-            </a:r>
-            <a:r>
-              <a:rPr lang="en-US" i="1" dirty="0" err="1" smtClean="0"/>
-              <a:t>HomeScreenHandler</a:t>
-            </a:r>
-            <a:endParaRPr lang="en-US" i="1" dirty="0"/>
-          </a:p>
-        </p:txBody>
-      </p:sp>
-      <p:pic>
-        <p:nvPicPr>
-          <p:cNvPr id="4" name="Picture 3"/>
-          <p:cNvPicPr>
-            <a:picLocks noChangeAspect="1"/>
-          </p:cNvPicPr>
-          <p:nvPr/>
-        </p:nvPicPr>
-        <p:blipFill>
-          <a:blip r:embed="rId4"/>
-          <a:stretch>
-            <a:fillRect/>
-          </a:stretch>
-        </p:blipFill>
-        <p:spPr>
-          <a:xfrm>
-            <a:off x="1253532" y="2072733"/>
-            <a:ext cx="2707170" cy="1841763"/>
-          </a:xfrm>
-          <a:prstGeom prst="rect">
-            <a:avLst/>
-          </a:prstGeom>
-        </p:spPr>
-      </p:pic>
-      <p:sp>
-        <p:nvSpPr>
-          <p:cNvPr id="8" name="TextBox 7"/>
-          <p:cNvSpPr txBox="1"/>
-          <p:nvPr/>
-        </p:nvSpPr>
-        <p:spPr>
-          <a:xfrm>
-            <a:off x="4060093" y="3391276"/>
-            <a:ext cx="3622855" cy="523220"/>
-          </a:xfrm>
-          <a:prstGeom prst="rect">
-            <a:avLst/>
-          </a:prstGeom>
-          <a:noFill/>
-        </p:spPr>
-        <p:txBody>
-          <a:bodyPr wrap="square" rtlCol="0">
-            <a:spAutoFit/>
-          </a:bodyPr>
-          <a:lstStyle/>
-          <a:p>
-            <a:r>
-              <a:rPr lang="en-US" i="1" dirty="0" err="1" smtClean="0"/>
-              <a:t>Chức</a:t>
-            </a:r>
-            <a:r>
-              <a:rPr lang="en-US" i="1" dirty="0" smtClean="0"/>
-              <a:t> </a:t>
-            </a:r>
-            <a:r>
-              <a:rPr lang="en-US" i="1" dirty="0" err="1" smtClean="0"/>
-              <a:t>năng</a:t>
-            </a:r>
-            <a:r>
-              <a:rPr lang="en-US" i="1" dirty="0" smtClean="0"/>
-              <a:t> </a:t>
-            </a:r>
-            <a:r>
-              <a:rPr lang="en-US" i="1" dirty="0" err="1" smtClean="0"/>
-              <a:t>tìm</a:t>
-            </a:r>
-            <a:r>
-              <a:rPr lang="en-US" i="1" dirty="0" smtClean="0"/>
-              <a:t> </a:t>
-            </a:r>
-            <a:r>
-              <a:rPr lang="en-US" i="1" dirty="0" err="1" smtClean="0"/>
-              <a:t>kiếm</a:t>
-            </a:r>
-            <a:r>
-              <a:rPr lang="en-US" i="1" dirty="0" smtClean="0"/>
-              <a:t> </a:t>
-            </a:r>
-            <a:r>
-              <a:rPr lang="en-US" i="1" dirty="0" err="1" smtClean="0"/>
-              <a:t>theo</a:t>
-            </a:r>
-            <a:r>
-              <a:rPr lang="en-US" i="1" dirty="0" smtClean="0"/>
-              <a:t> </a:t>
-            </a:r>
-            <a:r>
-              <a:rPr lang="en-US" i="1" dirty="0" err="1" smtClean="0"/>
-              <a:t>từng</a:t>
-            </a:r>
-            <a:r>
-              <a:rPr lang="en-US" i="1" dirty="0" smtClean="0"/>
-              <a:t> </a:t>
-            </a:r>
-            <a:r>
-              <a:rPr lang="en-US" i="1" dirty="0" err="1" smtClean="0"/>
-              <a:t>loại</a:t>
-            </a:r>
-            <a:r>
-              <a:rPr lang="en-US" i="1" dirty="0" smtClean="0"/>
-              <a:t> Media </a:t>
-            </a:r>
-            <a:r>
-              <a:rPr lang="en-US" i="1" dirty="0" err="1" smtClean="0"/>
-              <a:t>trên</a:t>
-            </a:r>
-            <a:r>
-              <a:rPr lang="en-US" i="1" dirty="0" smtClean="0"/>
-              <a:t> </a:t>
-            </a:r>
-            <a:r>
-              <a:rPr lang="en-US" i="1" dirty="0" err="1" smtClean="0"/>
-              <a:t>giao</a:t>
-            </a:r>
-            <a:r>
-              <a:rPr lang="en-US" i="1" dirty="0" smtClean="0"/>
-              <a:t> </a:t>
-            </a:r>
-            <a:r>
-              <a:rPr lang="en-US" i="1" dirty="0" err="1" smtClean="0"/>
-              <a:t>diện</a:t>
-            </a:r>
-            <a:endParaRPr lang="en-US" i="1" dirty="0"/>
-          </a:p>
-        </p:txBody>
-      </p:sp>
     </p:spTree>
     <p:extLst>
       <p:ext uri="{BB962C8B-B14F-4D97-AF65-F5344CB8AC3E}">
@@ -17877,7 +17669,7 @@
         </p:nvSpPr>
         <p:spPr>
           <a:xfrm>
-            <a:off x="3824612" y="6077322"/>
+            <a:off x="3824612" y="4738256"/>
             <a:ext cx="1438214" cy="307777"/>
           </a:xfrm>
           <a:prstGeom prst="rect">
@@ -17892,40 +17684,40 @@
           <a:lstStyle/>
           <a:p>
             <a:r>
-              <a:rPr lang="en-US" i="1" dirty="0" err="1"/>
+              <a:rPr lang="en-US" dirty="0" err="1"/>
               <a:t>Thiết</a:t>
             </a:r>
             <a:r>
-              <a:rPr lang="en-US" i="1" dirty="0"/>
-              <a:t> </a:t>
-            </a:r>
-            <a:r>
-              <a:rPr lang="en-US" i="1" dirty="0" err="1"/>
+              <a:rPr lang="en-US" dirty="0"/>
+              <a:t> </a:t>
+            </a:r>
+            <a:r>
+              <a:rPr lang="en-US" dirty="0" err="1"/>
               <a:t>kế</a:t>
             </a:r>
             <a:r>
-              <a:rPr lang="en-US" i="1" dirty="0"/>
-              <a:t> </a:t>
-            </a:r>
-            <a:r>
-              <a:rPr lang="en-US" i="1" dirty="0" err="1"/>
+              <a:rPr lang="en-US" dirty="0"/>
+              <a:t> </a:t>
+            </a:r>
+            <a:r>
+              <a:rPr lang="en-US" dirty="0" err="1"/>
               <a:t>cải</a:t>
             </a:r>
             <a:r>
-              <a:rPr lang="en-US" i="1" dirty="0"/>
-              <a:t> </a:t>
-            </a:r>
-            <a:r>
-              <a:rPr lang="en-US" i="1" dirty="0" err="1"/>
+              <a:rPr lang="en-US" dirty="0"/>
+              <a:t> </a:t>
+            </a:r>
+            <a:r>
+              <a:rPr lang="en-US" dirty="0" err="1"/>
               <a:t>tiến</a:t>
             </a:r>
-            <a:endParaRPr lang="en-US" i="1" dirty="0"/>
+            <a:endParaRPr lang="en-US" dirty="0"/>
           </a:p>
         </p:txBody>
       </p:sp>
       <p:pic>
         <p:nvPicPr>
-          <p:cNvPr id="8" name="Picture 7">
+          <p:cNvPr id="8" name="Picture 7" descr="Diagram&#10;&#10;Description automatically generated">
             <a:extLst>
               <a:ext uri="{FF2B5EF4-FFF2-40B4-BE49-F238E27FC236}">
                 <a16:creationId xmlns:a16="http://schemas.microsoft.com/office/drawing/2014/main" id="{2F96D2B6-BE22-D46E-3C09-018BE4D313C3}"/>
@@ -17951,8 +17743,8 @@
         </p:blipFill>
         <p:spPr>
           <a:xfrm>
-            <a:off x="821496" y="2004287"/>
-            <a:ext cx="7444445" cy="3965308"/>
+            <a:off x="1600200" y="2191702"/>
+            <a:ext cx="5943600" cy="2474595"/>
           </a:xfrm>
           <a:prstGeom prst="rect">
             <a:avLst/>
@@ -18429,7 +18221,7 @@
           <a:lstStyle/>
           <a:p>
             <a:r>
-              <a:rPr lang="en-US" i="1" dirty="0"/>
+              <a:rPr lang="en-US" dirty="0"/>
               <a:t>Java Reflections</a:t>
             </a:r>
           </a:p>
@@ -18935,19 +18727,19 @@
           <a:lstStyle/>
           <a:p>
             <a:r>
-              <a:rPr lang="en-US" i="1" dirty="0" err="1"/>
+              <a:rPr lang="en-US" dirty="0" err="1"/>
               <a:t>Cài</a:t>
             </a:r>
             <a:r>
-              <a:rPr lang="en-US" i="1" dirty="0"/>
-              <a:t> </a:t>
-            </a:r>
-            <a:r>
-              <a:rPr lang="en-US" i="1" dirty="0" err="1"/>
+              <a:rPr lang="en-US" dirty="0"/>
+              <a:t> </a:t>
+            </a:r>
+            <a:r>
+              <a:rPr lang="en-US" dirty="0" err="1"/>
               <a:t>đặt</a:t>
             </a:r>
             <a:r>
-              <a:rPr lang="en-US" i="1" dirty="0"/>
+              <a:rPr lang="en-US" dirty="0"/>
               <a:t> Java Annotation @DisplayName</a:t>
             </a:r>
           </a:p>
@@ -18982,26 +18774,26 @@
           <a:lstStyle/>
           <a:p>
             <a:r>
-              <a:rPr lang="en-US" i="1" dirty="0" err="1"/>
+              <a:rPr lang="en-US" dirty="0" err="1"/>
               <a:t>Sử</a:t>
             </a:r>
             <a:r>
-              <a:rPr lang="en-US" i="1" dirty="0"/>
-              <a:t> </a:t>
-            </a:r>
-            <a:r>
-              <a:rPr lang="en-US" i="1" dirty="0" err="1"/>
+              <a:rPr lang="en-US" dirty="0"/>
+              <a:t> </a:t>
+            </a:r>
+            <a:r>
+              <a:rPr lang="en-US" dirty="0" err="1"/>
               <a:t>dụng</a:t>
             </a:r>
             <a:r>
-              <a:rPr lang="en-US" i="1" dirty="0"/>
+              <a:rPr lang="en-US" dirty="0"/>
               <a:t> Java </a:t>
             </a:r>
             <a:r>
-              <a:rPr lang="en-US" i="1" dirty="0" err="1"/>
+              <a:rPr lang="en-US" dirty="0" err="1"/>
               <a:t>Anotation</a:t>
             </a:r>
-            <a:endParaRPr lang="en-US" i="1" dirty="0"/>
+            <a:endParaRPr lang="en-US" dirty="0"/>
           </a:p>
         </p:txBody>
       </p:sp>
@@ -19638,7 +19430,7 @@
       </p:sp>
       <p:pic>
         <p:nvPicPr>
-          <p:cNvPr id="13" name="Picture 12">
+          <p:cNvPr id="13" name="Picture 12" descr="A picture containing table&#10;&#10;Description automatically generated">
             <a:extLst>
               <a:ext uri="{FF2B5EF4-FFF2-40B4-BE49-F238E27FC236}">
                 <a16:creationId xmlns:a16="http://schemas.microsoft.com/office/drawing/2014/main" id="{267502CD-A561-C062-ACF9-6E899A6AD573}"/>
@@ -19651,7 +19443,7 @@
           <p:nvPr/>
         </p:nvPicPr>
         <p:blipFill>
-          <a:blip r:embed="rId3">
+          <a:blip r:embed="rId3" cstate="print">
             <a:extLst>
               <a:ext uri="{28A0092B-C50C-407E-A947-70E740481C1C}">
                 <a14:useLocalDpi xmlns:a14="http://schemas.microsoft.com/office/drawing/2010/main" val="0"/>
@@ -19664,8 +19456,8 @@
         </p:blipFill>
         <p:spPr>
           <a:xfrm>
-            <a:off x="717401" y="2296490"/>
-            <a:ext cx="7709198" cy="3895497"/>
+            <a:off x="707059" y="2296490"/>
+            <a:ext cx="7729882" cy="3895497"/>
           </a:xfrm>
           <a:prstGeom prst="rect">
             <a:avLst/>
@@ -23916,42 +23708,6 @@
           </a:p>
         </p:txBody>
       </p:sp>
-      <p:pic>
-        <p:nvPicPr>
-          <p:cNvPr id="6" name="Picture 5">
-            <a:extLst>
-              <a:ext uri="{FF2B5EF4-FFF2-40B4-BE49-F238E27FC236}">
-                <a16:creationId xmlns:a16="http://schemas.microsoft.com/office/drawing/2014/main" id="{0F5817B0-0FBD-1298-5990-67F7DBA6F49F}"/>
-              </a:ext>
-            </a:extLst>
-          </p:cNvPr>
-          <p:cNvPicPr>
-            <a:picLocks noChangeAspect="1"/>
-          </p:cNvPicPr>
-          <p:nvPr/>
-        </p:nvPicPr>
-        <p:blipFill>
-          <a:blip r:embed="rId3">
-            <a:extLst>
-              <a:ext uri="{28A0092B-C50C-407E-A947-70E740481C1C}">
-                <a14:useLocalDpi xmlns:a14="http://schemas.microsoft.com/office/drawing/2010/main" val="0"/>
-              </a:ext>
-            </a:extLst>
-          </a:blip>
-          <a:stretch>
-            <a:fillRect/>
-          </a:stretch>
-        </p:blipFill>
-        <p:spPr>
-          <a:xfrm>
-            <a:off x="512455" y="683280"/>
-            <a:ext cx="8411937" cy="6174720"/>
-          </a:xfrm>
-          <a:prstGeom prst="rect">
-            <a:avLst/>
-          </a:prstGeom>
-        </p:spPr>
-      </p:pic>
       <p:sp>
         <p:nvSpPr>
           <p:cNvPr id="7" name="TextBox 6">
@@ -23966,7 +23722,7 @@
         </p:nvSpPr>
         <p:spPr>
           <a:xfrm>
-            <a:off x="4150574" y="6403835"/>
+            <a:off x="3547471" y="6068887"/>
             <a:ext cx="2049058" cy="375552"/>
           </a:xfrm>
           <a:prstGeom prst="rect">
@@ -24081,6 +23837,36 @@
           </a:p>
         </p:txBody>
       </p:sp>
+      <p:pic>
+        <p:nvPicPr>
+          <p:cNvPr id="3" name="Picture 2" descr="Diagram&#10;&#10;Description automatically generated">
+            <a:extLst>
+              <a:ext uri="{FF2B5EF4-FFF2-40B4-BE49-F238E27FC236}">
+                <a16:creationId xmlns:a16="http://schemas.microsoft.com/office/drawing/2014/main" id="{A42F1215-270C-635A-1BC5-5A1875561CB9}"/>
+              </a:ext>
+            </a:extLst>
+          </p:cNvPr>
+          <p:cNvPicPr>
+            <a:picLocks noChangeAspect="1"/>
+          </p:cNvPicPr>
+          <p:nvPr/>
+        </p:nvPicPr>
+        <p:blipFill>
+          <a:blip r:embed="rId3"/>
+          <a:stretch>
+            <a:fillRect/>
+          </a:stretch>
+        </p:blipFill>
+        <p:spPr>
+          <a:xfrm>
+            <a:off x="0" y="789112"/>
+            <a:ext cx="9144000" cy="5279775"/>
+          </a:xfrm>
+          <a:prstGeom prst="rect">
+            <a:avLst/>
+          </a:prstGeom>
+        </p:spPr>
+      </p:pic>
     </p:spTree>
     <p:extLst>
       <p:ext uri="{BB962C8B-B14F-4D97-AF65-F5344CB8AC3E}">
@@ -24271,7 +24057,7 @@
         </p:nvSpPr>
         <p:spPr>
           <a:xfrm>
-            <a:off x="3547471" y="6123341"/>
+            <a:off x="3547471" y="6051243"/>
             <a:ext cx="2049058" cy="375552"/>
           </a:xfrm>
           <a:prstGeom prst="rect">
@@ -24388,10 +24174,10 @@
       </p:sp>
       <p:pic>
         <p:nvPicPr>
-          <p:cNvPr id="8" name="Picture 7">
+          <p:cNvPr id="3" name="Picture 2" descr="Diagram&#10;&#10;Description automatically generated">
             <a:extLst>
               <a:ext uri="{FF2B5EF4-FFF2-40B4-BE49-F238E27FC236}">
-                <a16:creationId xmlns:a16="http://schemas.microsoft.com/office/drawing/2014/main" id="{C24A0CA2-9A8B-D95A-28CC-40006FFCA998}"/>
+                <a16:creationId xmlns:a16="http://schemas.microsoft.com/office/drawing/2014/main" id="{2AB61E2F-8F17-475F-B3EF-69133401A3AB}"/>
               </a:ext>
             </a:extLst>
           </p:cNvPr>
@@ -24401,21 +24187,15 @@
           <p:nvPr/>
         </p:nvPicPr>
         <p:blipFill>
-          <a:blip r:embed="rId3">
-            <a:extLst>
-              <a:ext uri="{28A0092B-C50C-407E-A947-70E740481C1C}">
-                <a14:useLocalDpi xmlns:a14="http://schemas.microsoft.com/office/drawing/2010/main" val="0"/>
-              </a:ext>
-            </a:extLst>
-          </a:blip>
+          <a:blip r:embed="rId3"/>
           <a:stretch>
             <a:fillRect/>
           </a:stretch>
         </p:blipFill>
         <p:spPr>
           <a:xfrm>
-            <a:off x="0" y="783461"/>
-            <a:ext cx="9144000" cy="5448897"/>
+            <a:off x="0" y="704551"/>
+            <a:ext cx="9144000" cy="5448898"/>
           </a:xfrm>
           <a:prstGeom prst="rect">
             <a:avLst/>
@@ -28134,7 +27914,7 @@
       </p:sp>
       <p:pic>
         <p:nvPicPr>
-          <p:cNvPr id="8" name="Picture 7">
+          <p:cNvPr id="8" name="Picture 7" descr="Diagram&#10;&#10;Description automatically generated">
             <a:extLst>
               <a:ext uri="{FF2B5EF4-FFF2-40B4-BE49-F238E27FC236}">
                 <a16:creationId xmlns:a16="http://schemas.microsoft.com/office/drawing/2014/main" id="{894957AE-9054-0B9C-0594-4B0532F86D1B}"/>
@@ -28147,7 +27927,7 @@
           <p:nvPr/>
         </p:nvPicPr>
         <p:blipFill>
-          <a:blip r:embed="rId3">
+          <a:blip r:embed="rId3" cstate="print">
             <a:extLst>
               <a:ext uri="{28A0092B-C50C-407E-A947-70E740481C1C}">
                 <a14:useLocalDpi xmlns:a14="http://schemas.microsoft.com/office/drawing/2010/main" val="0"/>
@@ -28160,8 +27940,8 @@
         </p:blipFill>
         <p:spPr>
           <a:xfrm>
-            <a:off x="187" y="2294409"/>
-            <a:ext cx="9147073" cy="2469615"/>
+            <a:off x="1" y="2294409"/>
+            <a:ext cx="9147446" cy="2469615"/>
           </a:xfrm>
           <a:prstGeom prst="rect">
             <a:avLst/>
@@ -29720,348 +29500,652 @@
           </a:p>
         </p:txBody>
       </p:sp>
-      <p:sp>
-        <p:nvSpPr>
-          <p:cNvPr id="3" name="TextBox 2"/>
-          <p:cNvSpPr txBox="1"/>
-          <p:nvPr/>
-        </p:nvSpPr>
-        <p:spPr>
-          <a:xfrm>
-            <a:off x="405353" y="820132"/>
-            <a:ext cx="8191892" cy="4847994"/>
-          </a:xfrm>
-          <a:prstGeom prst="rect">
-            <a:avLst/>
-          </a:prstGeom>
-          <a:noFill/>
-        </p:spPr>
-        <p:txBody>
-          <a:bodyPr wrap="square" rtlCol="0">
-            <a:spAutoFit/>
-          </a:bodyPr>
-          <a:lstStyle/>
-          <a:p>
-            <a:pPr marL="342900" indent="-342900">
-              <a:lnSpc>
-                <a:spcPct val="150000"/>
-              </a:lnSpc>
-              <a:buAutoNum type="arabicPeriod"/>
-            </a:pPr>
-            <a:r>
-              <a:rPr lang="en-US" sz="1600" dirty="0" err="1"/>
-              <a:t>Phát</a:t>
-            </a:r>
-            <a:r>
-              <a:rPr lang="en-US" sz="1600" dirty="0"/>
-              <a:t> </a:t>
-            </a:r>
-            <a:r>
-              <a:rPr lang="en-US" sz="1600" dirty="0" err="1"/>
-              <a:t>hiện</a:t>
-            </a:r>
-            <a:r>
-              <a:rPr lang="en-US" sz="1600" dirty="0"/>
-              <a:t>, </a:t>
-            </a:r>
-            <a:r>
-              <a:rPr lang="en-US" sz="1600" dirty="0" err="1"/>
-              <a:t>xử</a:t>
-            </a:r>
-            <a:r>
-              <a:rPr lang="en-US" sz="1600" dirty="0"/>
-              <a:t> </a:t>
-            </a:r>
-            <a:r>
-              <a:rPr lang="en-US" sz="1600" dirty="0" err="1"/>
-              <a:t>lý</a:t>
-            </a:r>
-            <a:r>
-              <a:rPr lang="en-US" sz="1600" dirty="0"/>
-              <a:t> </a:t>
-            </a:r>
-            <a:r>
-              <a:rPr lang="en-US" sz="1600" dirty="0" err="1"/>
-              <a:t>các</a:t>
-            </a:r>
-            <a:r>
-              <a:rPr lang="en-US" sz="1600" dirty="0"/>
-              <a:t> </a:t>
-            </a:r>
-            <a:r>
-              <a:rPr lang="en-US" sz="1600" dirty="0" err="1"/>
-              <a:t>vấn</a:t>
-            </a:r>
-            <a:r>
-              <a:rPr lang="en-US" sz="1600" dirty="0"/>
-              <a:t> </a:t>
-            </a:r>
-            <a:r>
-              <a:rPr lang="en-US" sz="1600" dirty="0" err="1"/>
-              <a:t>đề</a:t>
-            </a:r>
-            <a:r>
-              <a:rPr lang="en-US" sz="1600" dirty="0"/>
-              <a:t> cohesion / coupling / SOLID / clean code: </a:t>
-            </a:r>
-          </a:p>
-          <a:p>
-            <a:pPr>
-              <a:lnSpc>
-                <a:spcPct val="150000"/>
-              </a:lnSpc>
-            </a:pPr>
-            <a:r>
-              <a:rPr lang="en-US" sz="1600" dirty="0"/>
-              <a:t>Chia </a:t>
-            </a:r>
-            <a:r>
-              <a:rPr lang="en-US" sz="1600" dirty="0" err="1"/>
-              <a:t>theo</a:t>
-            </a:r>
-            <a:r>
-              <a:rPr lang="en-US" sz="1600" dirty="0"/>
-              <a:t> </a:t>
-            </a:r>
-            <a:r>
-              <a:rPr lang="en-US" sz="1600" dirty="0" err="1"/>
-              <a:t>subteam</a:t>
-            </a:r>
-            <a:r>
-              <a:rPr lang="en-US" sz="1600" dirty="0"/>
-              <a:t>: </a:t>
-            </a:r>
-          </a:p>
-          <a:p>
-            <a:pPr marL="285750" indent="-285750">
-              <a:lnSpc>
-                <a:spcPct val="150000"/>
-              </a:lnSpc>
-              <a:buFontTx/>
-              <a:buChar char="-"/>
-            </a:pPr>
-            <a:r>
-              <a:rPr lang="en-US" sz="1600" dirty="0"/>
-              <a:t>Hiếu + </a:t>
-            </a:r>
-            <a:r>
-              <a:rPr lang="en-US" sz="1600" dirty="0" err="1"/>
-              <a:t>Tuân</a:t>
-            </a:r>
-            <a:r>
-              <a:rPr lang="en-US" sz="1600" dirty="0"/>
-              <a:t>: common + controller + </a:t>
-            </a:r>
-            <a:r>
-              <a:rPr lang="en-US" sz="1600" dirty="0" err="1"/>
-              <a:t>dao</a:t>
-            </a:r>
-            <a:r>
-              <a:rPr lang="en-US" sz="1600" dirty="0"/>
-              <a:t> + entity</a:t>
-            </a:r>
-          </a:p>
-          <a:p>
-            <a:pPr marL="285750" indent="-285750">
-              <a:lnSpc>
-                <a:spcPct val="150000"/>
-              </a:lnSpc>
-              <a:buFontTx/>
-              <a:buChar char="-"/>
-            </a:pPr>
-            <a:r>
-              <a:rPr lang="en-US" sz="1600" dirty="0" err="1"/>
-              <a:t>Hùng</a:t>
-            </a:r>
-            <a:r>
-              <a:rPr lang="en-US" sz="1600" dirty="0"/>
-              <a:t> + </a:t>
-            </a:r>
-            <a:r>
-              <a:rPr lang="en-US" sz="1600" dirty="0" err="1"/>
-              <a:t>Quốc</a:t>
-            </a:r>
-            <a:r>
-              <a:rPr lang="en-US" sz="1600" dirty="0"/>
-              <a:t>: subsystem + </a:t>
-            </a:r>
-            <a:r>
-              <a:rPr lang="en-US" sz="1600" dirty="0" err="1"/>
-              <a:t>utils</a:t>
-            </a:r>
-            <a:r>
-              <a:rPr lang="en-US" sz="1600" dirty="0"/>
-              <a:t> + </a:t>
-            </a:r>
-            <a:r>
-              <a:rPr lang="en-US" sz="1600" dirty="0" err="1"/>
-              <a:t>views.screen</a:t>
-            </a:r>
-            <a:endParaRPr lang="en-US" sz="1600" dirty="0"/>
-          </a:p>
-          <a:p>
-            <a:pPr>
-              <a:lnSpc>
-                <a:spcPct val="150000"/>
-              </a:lnSpc>
-            </a:pPr>
-            <a:r>
-              <a:rPr lang="en-US" sz="1600" dirty="0"/>
-              <a:t>2. </a:t>
-            </a:r>
-            <a:r>
-              <a:rPr lang="vi-VN" sz="1600" dirty="0"/>
-              <a:t>Thay đổi trong tương lai:</a:t>
-            </a:r>
-            <a:br>
-              <a:rPr lang="vi-VN" sz="1600" dirty="0"/>
-            </a:br>
-            <a:r>
-              <a:rPr lang="en-US" sz="1600" dirty="0"/>
-              <a:t>- </a:t>
-            </a:r>
-            <a:r>
-              <a:rPr lang="vi-VN" sz="1600" dirty="0"/>
-              <a:t>Số 1: Hùng + Quốc</a:t>
-            </a:r>
-            <a:br>
-              <a:rPr lang="vi-VN" sz="1600" dirty="0"/>
-            </a:br>
-            <a:r>
-              <a:rPr lang="en-US" sz="1600" dirty="0"/>
-              <a:t>- </a:t>
-            </a:r>
-            <a:r>
-              <a:rPr lang="vi-VN" sz="1600" dirty="0"/>
-              <a:t>Số 2: Hùng + Hiếu</a:t>
-            </a:r>
-            <a:br>
-              <a:rPr lang="vi-VN" sz="1600" dirty="0"/>
-            </a:br>
-            <a:r>
-              <a:rPr lang="en-US" sz="1600" dirty="0"/>
-              <a:t>- </a:t>
-            </a:r>
-            <a:r>
-              <a:rPr lang="vi-VN" sz="1600" dirty="0"/>
-              <a:t>Số 3: Hiếu + Tuân</a:t>
-            </a:r>
-            <a:br>
-              <a:rPr lang="vi-VN" sz="1600" dirty="0"/>
-            </a:br>
-            <a:r>
-              <a:rPr lang="en-US" sz="1600" dirty="0"/>
-              <a:t>- </a:t>
-            </a:r>
-            <a:r>
-              <a:rPr lang="vi-VN" sz="1600" dirty="0"/>
-              <a:t>Số 4 + 6: Hiếu + Hùng</a:t>
-            </a:r>
-            <a:br>
-              <a:rPr lang="vi-VN" sz="1600" dirty="0"/>
-            </a:br>
-            <a:r>
-              <a:rPr lang="en-US" sz="1600" dirty="0"/>
-              <a:t>- </a:t>
-            </a:r>
-            <a:r>
-              <a:rPr lang="vi-VN" sz="1600" dirty="0"/>
-              <a:t>Số 5: Tuân + Quốc</a:t>
-            </a:r>
-            <a:br>
-              <a:rPr lang="vi-VN" sz="1600" dirty="0"/>
-            </a:br>
-            <a:r>
-              <a:rPr lang="en-US" sz="1600" dirty="0"/>
-              <a:t>- </a:t>
-            </a:r>
-            <a:r>
-              <a:rPr lang="vi-VN" sz="1600" dirty="0"/>
-              <a:t>Số 7: Hùng + Hiếu</a:t>
-            </a:r>
-            <a:endParaRPr lang="en-US" sz="1600" dirty="0"/>
-          </a:p>
-          <a:p>
-            <a:pPr>
-              <a:lnSpc>
-                <a:spcPct val="150000"/>
-              </a:lnSpc>
-            </a:pPr>
-            <a:r>
-              <a:rPr lang="en-US" sz="1600" dirty="0"/>
-              <a:t>3. </a:t>
-            </a:r>
-            <a:r>
-              <a:rPr lang="en-US" sz="1600" dirty="0" err="1"/>
-              <a:t>Vẽ</a:t>
-            </a:r>
-            <a:r>
-              <a:rPr lang="en-US" sz="1600" dirty="0"/>
-              <a:t> </a:t>
-            </a:r>
-            <a:r>
-              <a:rPr lang="en-US" sz="1600" dirty="0" err="1"/>
-              <a:t>biểu</a:t>
-            </a:r>
-            <a:r>
-              <a:rPr lang="en-US" sz="1600" dirty="0"/>
-              <a:t> </a:t>
-            </a:r>
-            <a:r>
-              <a:rPr lang="en-US" sz="1600" dirty="0" err="1"/>
-              <a:t>đồ</a:t>
-            </a:r>
-            <a:r>
-              <a:rPr lang="vi-VN" sz="1600" dirty="0"/>
-              <a:t>: Hùng</a:t>
-            </a:r>
-            <a:r>
-              <a:rPr lang="en-US" sz="1600" dirty="0"/>
-              <a:t> + Hiếu</a:t>
-            </a:r>
-          </a:p>
-          <a:p>
-            <a:pPr>
-              <a:lnSpc>
-                <a:spcPct val="150000"/>
-              </a:lnSpc>
-            </a:pPr>
-            <a:r>
-              <a:rPr lang="en-US" sz="1600" dirty="0"/>
-              <a:t>4. </a:t>
-            </a:r>
-            <a:r>
-              <a:rPr lang="en-US" sz="1600" dirty="0" err="1"/>
-              <a:t>Làm</a:t>
-            </a:r>
-            <a:r>
-              <a:rPr lang="en-US" sz="1600" dirty="0"/>
-              <a:t> </a:t>
-            </a:r>
-            <a:r>
-              <a:rPr lang="en-US" sz="1600" dirty="0" err="1"/>
-              <a:t>báo</a:t>
-            </a:r>
-            <a:r>
-              <a:rPr lang="en-US" sz="1600" dirty="0"/>
-              <a:t> </a:t>
-            </a:r>
-            <a:r>
-              <a:rPr lang="en-US" sz="1600" dirty="0" err="1"/>
-              <a:t>cáo</a:t>
-            </a:r>
-            <a:r>
-              <a:rPr lang="en-US" sz="1600" dirty="0"/>
-              <a:t>: </a:t>
-            </a:r>
-            <a:r>
-              <a:rPr lang="en-US" sz="1600" dirty="0" err="1"/>
-              <a:t>Hùng</a:t>
-            </a:r>
-            <a:endParaRPr lang="en-US" sz="1600" dirty="0"/>
-          </a:p>
-        </p:txBody>
-      </p:sp>
+      <p:graphicFrame>
+        <p:nvGraphicFramePr>
+          <p:cNvPr id="2" name="Table 3">
+            <a:extLst>
+              <a:ext uri="{FF2B5EF4-FFF2-40B4-BE49-F238E27FC236}">
+                <a16:creationId xmlns:a16="http://schemas.microsoft.com/office/drawing/2014/main" id="{B3ED09F9-AD25-8A88-B267-FAB612A85F6C}"/>
+              </a:ext>
+            </a:extLst>
+          </p:cNvPr>
+          <p:cNvGraphicFramePr>
+            <a:graphicFrameLocks noGrp="1"/>
+          </p:cNvGraphicFramePr>
+          <p:nvPr>
+            <p:extLst>
+              <p:ext uri="{D42A27DB-BD31-4B8C-83A1-F6EECF244321}">
+                <p14:modId xmlns:p14="http://schemas.microsoft.com/office/powerpoint/2010/main" val="3490125063"/>
+              </p:ext>
+            </p:extLst>
+          </p:nvPr>
+        </p:nvGraphicFramePr>
+        <p:xfrm>
+          <a:off x="967740" y="1479296"/>
+          <a:ext cx="7208520" cy="2552409"/>
+        </p:xfrm>
+        <a:graphic>
+          <a:graphicData uri="http://schemas.openxmlformats.org/drawingml/2006/table">
+            <a:tbl>
+              <a:tblPr firstRow="1" bandRow="1">
+                <a:tableStyleId>{AFD22519-920E-4A79-9395-4B45224A8854}</a:tableStyleId>
+              </a:tblPr>
+              <a:tblGrid>
+                <a:gridCol w="3604260">
+                  <a:extLst>
+                    <a:ext uri="{9D8B030D-6E8A-4147-A177-3AD203B41FA5}">
+                      <a16:colId xmlns:a16="http://schemas.microsoft.com/office/drawing/2014/main" val="896629095"/>
+                    </a:ext>
+                  </a:extLst>
+                </a:gridCol>
+                <a:gridCol w="3604260">
+                  <a:extLst>
+                    <a:ext uri="{9D8B030D-6E8A-4147-A177-3AD203B41FA5}">
+                      <a16:colId xmlns:a16="http://schemas.microsoft.com/office/drawing/2014/main" val="3342985732"/>
+                    </a:ext>
+                  </a:extLst>
+                </a:gridCol>
+              </a:tblGrid>
+              <a:tr h="331216">
+                <a:tc>
+                  <a:txBody>
+                    <a:bodyPr/>
+                    <a:lstStyle/>
+                    <a:p>
+                      <a:pPr marL="0" marR="0" lvl="0" indent="0" algn="ctr" defTabSz="914400" rtl="0" eaLnBrk="1" fontAlgn="auto" latinLnBrk="0" hangingPunct="1">
+                        <a:lnSpc>
+                          <a:spcPct val="100000"/>
+                        </a:lnSpc>
+                        <a:spcBef>
+                          <a:spcPts val="0"/>
+                        </a:spcBef>
+                        <a:spcAft>
+                          <a:spcPts val="0"/>
+                        </a:spcAft>
+                        <a:buClr>
+                          <a:srgbClr val="000000"/>
+                        </a:buClr>
+                        <a:buSzTx/>
+                        <a:buFont typeface="Arial"/>
+                        <a:buNone/>
+                        <a:tabLst/>
+                        <a:defRPr/>
+                      </a:pPr>
+                      <a:r>
+                        <a:rPr lang="en-US" sz="1400" b="1" dirty="0" err="1"/>
+                        <a:t>Thành</a:t>
+                      </a:r>
+                      <a:r>
+                        <a:rPr lang="en-US" sz="1400" b="1" dirty="0"/>
+                        <a:t> </a:t>
+                      </a:r>
+                      <a:r>
+                        <a:rPr lang="en-US" sz="1400" b="1" dirty="0" err="1"/>
+                        <a:t>viên</a:t>
+                      </a:r>
+                      <a:endParaRPr lang="en-US" sz="1400" b="1" dirty="0"/>
+                    </a:p>
+                  </a:txBody>
+                  <a:tcPr/>
+                </a:tc>
+                <a:tc>
+                  <a:txBody>
+                    <a:bodyPr/>
+                    <a:lstStyle/>
+                    <a:p>
+                      <a:pPr algn="ctr"/>
+                      <a:r>
+                        <a:rPr lang="en-US" b="1" dirty="0" err="1"/>
+                        <a:t>Nhiệm</a:t>
+                      </a:r>
+                      <a:r>
+                        <a:rPr lang="en-US" b="1" dirty="0"/>
+                        <a:t> </a:t>
+                      </a:r>
+                      <a:r>
+                        <a:rPr lang="en-US" b="1" dirty="0" err="1"/>
+                        <a:t>vụ</a:t>
+                      </a:r>
+                      <a:endParaRPr lang="en-US" b="1" dirty="0"/>
+                    </a:p>
+                  </a:txBody>
+                  <a:tcPr/>
+                </a:tc>
+                <a:extLst>
+                  <a:ext uri="{0D108BD9-81ED-4DB2-BD59-A6C34878D82A}">
+                    <a16:rowId xmlns:a16="http://schemas.microsoft.com/office/drawing/2014/main" val="1212567298"/>
+                  </a:ext>
+                </a:extLst>
+              </a:tr>
+              <a:tr h="557784">
+                <a:tc>
+                  <a:txBody>
+                    <a:bodyPr/>
+                    <a:lstStyle/>
+                    <a:p>
+                      <a:pPr marL="0" marR="0" lvl="0" indent="0" algn="l" defTabSz="914400" rtl="0" eaLnBrk="1" fontAlgn="auto" latinLnBrk="0" hangingPunct="1">
+                        <a:lnSpc>
+                          <a:spcPct val="100000"/>
+                        </a:lnSpc>
+                        <a:spcBef>
+                          <a:spcPts val="0"/>
+                        </a:spcBef>
+                        <a:spcAft>
+                          <a:spcPts val="0"/>
+                        </a:spcAft>
+                        <a:buClr>
+                          <a:srgbClr val="000000"/>
+                        </a:buClr>
+                        <a:buSzTx/>
+                        <a:buFont typeface="Arial"/>
+                        <a:buNone/>
+                        <a:tabLst/>
+                        <a:defRPr/>
+                      </a:pPr>
+                      <a:r>
+                        <a:rPr lang="en-US" sz="1400" dirty="0" err="1"/>
+                        <a:t>Nguyễn</a:t>
+                      </a:r>
+                      <a:r>
+                        <a:rPr lang="en-US" sz="1400" dirty="0"/>
+                        <a:t> </a:t>
+                      </a:r>
+                      <a:r>
+                        <a:rPr lang="en-US" sz="1400" dirty="0" err="1"/>
+                        <a:t>Đình</a:t>
+                      </a:r>
+                      <a:r>
+                        <a:rPr lang="en-US" sz="1400" dirty="0"/>
+                        <a:t> </a:t>
+                      </a:r>
+                      <a:r>
+                        <a:rPr lang="en-US" sz="1400" dirty="0" err="1"/>
+                        <a:t>Hùng</a:t>
+                      </a:r>
+                      <a:endParaRPr lang="en-US" sz="1400" dirty="0"/>
+                    </a:p>
+                  </a:txBody>
+                  <a:tcPr/>
+                </a:tc>
+                <a:tc>
+                  <a:txBody>
+                    <a:bodyPr/>
+                    <a:lstStyle/>
+                    <a:p>
+                      <a:r>
+                        <a:rPr lang="en-US" dirty="0" err="1"/>
+                        <a:t>Thay</a:t>
+                      </a:r>
+                      <a:r>
+                        <a:rPr lang="en-US" dirty="0"/>
+                        <a:t> </a:t>
+                      </a:r>
+                      <a:r>
+                        <a:rPr lang="en-US" dirty="0" err="1"/>
+                        <a:t>đổi</a:t>
+                      </a:r>
+                      <a:r>
+                        <a:rPr lang="en-US" dirty="0"/>
+                        <a:t> </a:t>
+                      </a:r>
+                      <a:r>
+                        <a:rPr lang="en-US" dirty="0" err="1"/>
+                        <a:t>thư</a:t>
+                      </a:r>
+                      <a:r>
+                        <a:rPr lang="en-US" dirty="0"/>
+                        <a:t> </a:t>
+                      </a:r>
+                      <a:r>
+                        <a:rPr lang="en-US" dirty="0" err="1"/>
+                        <a:t>viện</a:t>
+                      </a:r>
+                      <a:r>
+                        <a:rPr lang="en-US" dirty="0"/>
+                        <a:t> </a:t>
+                      </a:r>
+                      <a:r>
+                        <a:rPr lang="en-US" dirty="0" err="1"/>
+                        <a:t>tính</a:t>
+                      </a:r>
+                      <a:r>
+                        <a:rPr lang="en-US" dirty="0"/>
+                        <a:t> </a:t>
+                      </a:r>
+                      <a:r>
+                        <a:rPr lang="en-US" dirty="0" err="1"/>
+                        <a:t>khoảng</a:t>
+                      </a:r>
+                      <a:r>
+                        <a:rPr lang="en-US" dirty="0"/>
+                        <a:t> </a:t>
+                      </a:r>
+                      <a:r>
+                        <a:rPr lang="en-US" dirty="0" err="1"/>
+                        <a:t>cách</a:t>
+                      </a:r>
+                      <a:r>
+                        <a:rPr lang="en-US" dirty="0"/>
+                        <a:t> </a:t>
+                      </a:r>
+                      <a:r>
+                        <a:rPr lang="en-US" dirty="0" err="1"/>
+                        <a:t>và</a:t>
+                      </a:r>
+                      <a:r>
+                        <a:rPr lang="en-US" dirty="0"/>
+                        <a:t> </a:t>
+                      </a:r>
+                      <a:r>
+                        <a:rPr lang="en-US" dirty="0" err="1"/>
+                        <a:t>công</a:t>
+                      </a:r>
+                      <a:r>
+                        <a:rPr lang="en-US" dirty="0"/>
+                        <a:t> </a:t>
+                      </a:r>
+                      <a:r>
+                        <a:rPr lang="en-US" dirty="0" err="1"/>
+                        <a:t>thức</a:t>
+                      </a:r>
+                      <a:r>
+                        <a:rPr lang="en-US" dirty="0"/>
+                        <a:t> </a:t>
+                      </a:r>
+                      <a:r>
+                        <a:rPr lang="en-US" dirty="0" err="1"/>
+                        <a:t>tính</a:t>
+                      </a:r>
+                      <a:r>
+                        <a:rPr lang="en-US" dirty="0"/>
+                        <a:t> chi </a:t>
+                      </a:r>
+                      <a:r>
+                        <a:rPr lang="en-US" dirty="0" err="1"/>
+                        <a:t>phí</a:t>
+                      </a:r>
+                      <a:endParaRPr lang="en-US" dirty="0"/>
+                    </a:p>
+                  </a:txBody>
+                  <a:tcPr/>
+                </a:tc>
+                <a:extLst>
+                  <a:ext uri="{0D108BD9-81ED-4DB2-BD59-A6C34878D82A}">
+                    <a16:rowId xmlns:a16="http://schemas.microsoft.com/office/drawing/2014/main" val="3987562261"/>
+                  </a:ext>
+                </a:extLst>
+              </a:tr>
+              <a:tr h="576072">
+                <a:tc>
+                  <a:txBody>
+                    <a:bodyPr/>
+                    <a:lstStyle/>
+                    <a:p>
+                      <a:r>
+                        <a:rPr lang="en-US" dirty="0" err="1"/>
+                        <a:t>Phạm</a:t>
+                      </a:r>
+                      <a:r>
+                        <a:rPr lang="en-US" dirty="0"/>
+                        <a:t> </a:t>
+                      </a:r>
+                      <a:r>
+                        <a:rPr lang="en-US" dirty="0" err="1"/>
+                        <a:t>Trung</a:t>
+                      </a:r>
+                      <a:r>
+                        <a:rPr lang="en-US" dirty="0"/>
+                        <a:t> </a:t>
+                      </a:r>
+                      <a:r>
+                        <a:rPr lang="en-US" dirty="0" err="1"/>
+                        <a:t>Hiếu</a:t>
+                      </a:r>
+                      <a:endParaRPr lang="en-US" dirty="0"/>
+                    </a:p>
+                  </a:txBody>
+                  <a:tcPr/>
+                </a:tc>
+                <a:tc>
+                  <a:txBody>
+                    <a:bodyPr/>
+                    <a:lstStyle/>
+                    <a:p>
+                      <a:r>
+                        <a:rPr lang="en-US" dirty="0" err="1"/>
+                        <a:t>Thay</a:t>
+                      </a:r>
+                      <a:r>
+                        <a:rPr lang="en-US" dirty="0"/>
+                        <a:t> </a:t>
+                      </a:r>
+                      <a:r>
+                        <a:rPr lang="en-US" dirty="0" err="1"/>
+                        <a:t>đổi</a:t>
+                      </a:r>
+                      <a:r>
+                        <a:rPr lang="en-US" dirty="0"/>
+                        <a:t> </a:t>
+                      </a:r>
+                      <a:r>
+                        <a:rPr lang="en-US" dirty="0" err="1"/>
+                        <a:t>yêu</a:t>
+                      </a:r>
+                      <a:r>
+                        <a:rPr lang="en-US" dirty="0"/>
+                        <a:t> </a:t>
+                      </a:r>
+                      <a:r>
+                        <a:rPr lang="en-US" dirty="0" err="1"/>
+                        <a:t>cầu</a:t>
+                      </a:r>
+                      <a:r>
+                        <a:rPr lang="en-US" dirty="0"/>
+                        <a:t> </a:t>
+                      </a:r>
+                      <a:r>
+                        <a:rPr lang="en-US" dirty="0" err="1"/>
+                        <a:t>khi</a:t>
+                      </a:r>
+                      <a:r>
+                        <a:rPr lang="en-US" dirty="0"/>
+                        <a:t> load </a:t>
+                      </a:r>
+                      <a:r>
+                        <a:rPr lang="en-US" dirty="0" err="1"/>
+                        <a:t>giao</a:t>
+                      </a:r>
+                      <a:r>
+                        <a:rPr lang="en-US" dirty="0"/>
+                        <a:t> </a:t>
+                      </a:r>
+                      <a:r>
+                        <a:rPr lang="en-US" dirty="0" err="1"/>
+                        <a:t>diện</a:t>
+                      </a:r>
+                      <a:endParaRPr lang="en-US" dirty="0"/>
+                    </a:p>
+                    <a:p>
+                      <a:r>
+                        <a:rPr lang="en-US" dirty="0" err="1"/>
+                        <a:t>Cập</a:t>
+                      </a:r>
+                      <a:r>
+                        <a:rPr lang="en-US" dirty="0"/>
+                        <a:t> </a:t>
+                      </a:r>
+                      <a:r>
+                        <a:rPr lang="en-US" dirty="0" err="1"/>
+                        <a:t>nhật</a:t>
+                      </a:r>
+                      <a:r>
+                        <a:rPr lang="en-US" dirty="0"/>
+                        <a:t> </a:t>
+                      </a:r>
+                      <a:r>
+                        <a:rPr lang="en-US" dirty="0" err="1"/>
+                        <a:t>chức</a:t>
+                      </a:r>
+                      <a:r>
+                        <a:rPr lang="en-US" dirty="0"/>
+                        <a:t> </a:t>
+                      </a:r>
+                      <a:r>
+                        <a:rPr lang="en-US" dirty="0" err="1"/>
+                        <a:t>năng</a:t>
+                      </a:r>
+                      <a:r>
+                        <a:rPr lang="en-US" dirty="0"/>
+                        <a:t> </a:t>
+                      </a:r>
+                      <a:r>
+                        <a:rPr lang="en-US" dirty="0" err="1"/>
+                        <a:t>hủy</a:t>
+                      </a:r>
+                      <a:r>
+                        <a:rPr lang="en-US" dirty="0"/>
+                        <a:t> </a:t>
+                      </a:r>
+                      <a:r>
+                        <a:rPr lang="en-US" dirty="0" err="1"/>
+                        <a:t>đơn</a:t>
+                      </a:r>
+                      <a:r>
+                        <a:rPr lang="en-US" dirty="0"/>
+                        <a:t> </a:t>
+                      </a:r>
+                      <a:r>
+                        <a:rPr lang="en-US" dirty="0" err="1"/>
+                        <a:t>hàng</a:t>
+                      </a:r>
+                      <a:endParaRPr lang="en-US" dirty="0"/>
+                    </a:p>
+                  </a:txBody>
+                  <a:tcPr/>
+                </a:tc>
+                <a:extLst>
+                  <a:ext uri="{0D108BD9-81ED-4DB2-BD59-A6C34878D82A}">
+                    <a16:rowId xmlns:a16="http://schemas.microsoft.com/office/drawing/2014/main" val="910979328"/>
+                  </a:ext>
+                </a:extLst>
+              </a:tr>
+              <a:tr h="566928">
+                <a:tc>
+                  <a:txBody>
+                    <a:bodyPr/>
+                    <a:lstStyle/>
+                    <a:p>
+                      <a:r>
+                        <a:rPr lang="en-US" dirty="0" err="1"/>
+                        <a:t>Phạm</a:t>
+                      </a:r>
+                      <a:r>
+                        <a:rPr lang="en-US" dirty="0"/>
+                        <a:t> </a:t>
+                      </a:r>
+                      <a:r>
+                        <a:rPr lang="en-US" dirty="0" err="1"/>
+                        <a:t>Hữu</a:t>
+                      </a:r>
+                      <a:r>
+                        <a:rPr lang="en-US" dirty="0"/>
+                        <a:t> Anh </a:t>
+                      </a:r>
+                      <a:r>
+                        <a:rPr lang="en-US" dirty="0" err="1"/>
+                        <a:t>Quốc</a:t>
+                      </a:r>
+                      <a:endParaRPr lang="en-US" dirty="0"/>
+                    </a:p>
+                  </a:txBody>
+                  <a:tcPr/>
+                </a:tc>
+                <a:tc>
+                  <a:txBody>
+                    <a:bodyPr/>
+                    <a:lstStyle/>
+                    <a:p>
+                      <a:r>
+                        <a:rPr lang="en-US" dirty="0" err="1"/>
+                        <a:t>Thêm</a:t>
+                      </a:r>
+                      <a:r>
+                        <a:rPr lang="en-US" dirty="0"/>
+                        <a:t> </a:t>
+                      </a:r>
+                      <a:r>
+                        <a:rPr lang="en-US" dirty="0" err="1"/>
+                        <a:t>mặt</a:t>
+                      </a:r>
+                      <a:r>
+                        <a:rPr lang="en-US" dirty="0"/>
+                        <a:t> </a:t>
+                      </a:r>
+                      <a:r>
+                        <a:rPr lang="en-US" dirty="0" err="1"/>
+                        <a:t>hàng</a:t>
+                      </a:r>
+                      <a:r>
+                        <a:rPr lang="en-US" dirty="0"/>
+                        <a:t> Media </a:t>
+                      </a:r>
+                      <a:r>
+                        <a:rPr lang="en-US" dirty="0" err="1"/>
+                        <a:t>mới</a:t>
+                      </a:r>
+                      <a:endParaRPr lang="en-US" dirty="0"/>
+                    </a:p>
+                    <a:p>
+                      <a:r>
+                        <a:rPr lang="en-US" dirty="0" err="1"/>
+                        <a:t>Thêm</a:t>
+                      </a:r>
+                      <a:r>
+                        <a:rPr lang="en-US" dirty="0"/>
+                        <a:t> </a:t>
+                      </a:r>
+                      <a:r>
+                        <a:rPr lang="en-US" dirty="0" err="1"/>
+                        <a:t>màn</a:t>
+                      </a:r>
+                      <a:r>
+                        <a:rPr lang="en-US" dirty="0"/>
+                        <a:t> </a:t>
+                      </a:r>
+                      <a:r>
+                        <a:rPr lang="en-US" dirty="0" err="1"/>
+                        <a:t>hình</a:t>
+                      </a:r>
+                      <a:r>
+                        <a:rPr lang="en-US" dirty="0"/>
+                        <a:t> </a:t>
+                      </a:r>
+                      <a:r>
+                        <a:rPr lang="en-US" dirty="0" err="1"/>
+                        <a:t>xem</a:t>
+                      </a:r>
+                      <a:r>
+                        <a:rPr lang="en-US" dirty="0"/>
+                        <a:t> chi </a:t>
+                      </a:r>
+                      <a:r>
+                        <a:rPr lang="en-US" dirty="0" err="1"/>
+                        <a:t>tiết</a:t>
+                      </a:r>
+                      <a:r>
+                        <a:rPr lang="en-US" dirty="0"/>
+                        <a:t> </a:t>
+                      </a:r>
+                      <a:r>
+                        <a:rPr lang="en-US" dirty="0" err="1"/>
+                        <a:t>sản</a:t>
+                      </a:r>
+                      <a:r>
+                        <a:rPr lang="en-US" dirty="0"/>
+                        <a:t> </a:t>
+                      </a:r>
+                      <a:r>
+                        <a:rPr lang="en-US" dirty="0" err="1"/>
+                        <a:t>phẩm</a:t>
+                      </a:r>
+                      <a:endParaRPr lang="en-US" dirty="0"/>
+                    </a:p>
+                  </a:txBody>
+                  <a:tcPr/>
+                </a:tc>
+                <a:extLst>
+                  <a:ext uri="{0D108BD9-81ED-4DB2-BD59-A6C34878D82A}">
+                    <a16:rowId xmlns:a16="http://schemas.microsoft.com/office/drawing/2014/main" val="217496897"/>
+                  </a:ext>
+                </a:extLst>
+              </a:tr>
+              <a:tr h="520409">
+                <a:tc>
+                  <a:txBody>
+                    <a:bodyPr/>
+                    <a:lstStyle/>
+                    <a:p>
+                      <a:r>
+                        <a:rPr lang="en-US" dirty="0" err="1"/>
+                        <a:t>Nguyễn</a:t>
+                      </a:r>
+                      <a:r>
+                        <a:rPr lang="en-US" dirty="0"/>
+                        <a:t> Minh </a:t>
+                      </a:r>
+                      <a:r>
+                        <a:rPr lang="en-US" dirty="0" err="1"/>
+                        <a:t>Tuân</a:t>
+                      </a:r>
+                      <a:endParaRPr lang="en-US" dirty="0"/>
+                    </a:p>
+                  </a:txBody>
+                  <a:tcPr/>
+                </a:tc>
+                <a:tc>
+                  <a:txBody>
+                    <a:bodyPr/>
+                    <a:lstStyle/>
+                    <a:p>
+                      <a:r>
+                        <a:rPr lang="en-US" dirty="0" err="1"/>
+                        <a:t>Thêm</a:t>
+                      </a:r>
+                      <a:r>
+                        <a:rPr lang="en-US" dirty="0"/>
+                        <a:t> </a:t>
+                      </a:r>
+                      <a:r>
+                        <a:rPr lang="en-US" dirty="0" err="1"/>
+                        <a:t>phương</a:t>
+                      </a:r>
+                      <a:r>
+                        <a:rPr lang="en-US" dirty="0"/>
+                        <a:t> </a:t>
+                      </a:r>
+                      <a:r>
+                        <a:rPr lang="en-US" dirty="0" err="1"/>
+                        <a:t>thức</a:t>
+                      </a:r>
+                      <a:r>
+                        <a:rPr lang="en-US" dirty="0"/>
+                        <a:t> </a:t>
+                      </a:r>
+                      <a:r>
+                        <a:rPr lang="en-US" dirty="0" err="1"/>
+                        <a:t>thanh</a:t>
+                      </a:r>
+                      <a:r>
+                        <a:rPr lang="en-US" dirty="0"/>
+                        <a:t> </a:t>
+                      </a:r>
+                      <a:r>
+                        <a:rPr lang="en-US" dirty="0" err="1"/>
+                        <a:t>toán</a:t>
+                      </a:r>
+                      <a:r>
+                        <a:rPr lang="en-US" dirty="0"/>
+                        <a:t> </a:t>
+                      </a:r>
+                      <a:r>
+                        <a:rPr lang="en-US" dirty="0" err="1"/>
+                        <a:t>mới</a:t>
+                      </a:r>
+                      <a:endParaRPr lang="en-US" dirty="0"/>
+                    </a:p>
+                  </a:txBody>
+                  <a:tcPr/>
+                </a:tc>
+                <a:extLst>
+                  <a:ext uri="{0D108BD9-81ED-4DB2-BD59-A6C34878D82A}">
+                    <a16:rowId xmlns:a16="http://schemas.microsoft.com/office/drawing/2014/main" val="2708165701"/>
+                  </a:ext>
+                </a:extLst>
+              </a:tr>
+            </a:tbl>
+          </a:graphicData>
+        </a:graphic>
+      </p:graphicFrame>
     </p:spTree>
     <p:extLst>
       <p:ext uri="{BB962C8B-B14F-4D97-AF65-F5344CB8AC3E}">
@@ -30879,34 +30963,34 @@
           <a:p>
             <a:pPr algn="ctr"/>
             <a:r>
-              <a:rPr lang="en-US" sz="1600" i="1" dirty="0" err="1"/>
+              <a:rPr lang="en-US" sz="1600" dirty="0" err="1"/>
               <a:t>Biểu</a:t>
             </a:r>
             <a:r>
-              <a:rPr lang="en-US" sz="1600" i="1" dirty="0"/>
-              <a:t> </a:t>
-            </a:r>
-            <a:r>
-              <a:rPr lang="en-US" sz="1600" i="1" dirty="0" err="1"/>
+              <a:rPr lang="en-US" sz="1600" dirty="0"/>
+              <a:t> </a:t>
+            </a:r>
+            <a:r>
+              <a:rPr lang="en-US" sz="1600" dirty="0" err="1"/>
               <a:t>đồ</a:t>
             </a:r>
             <a:r>
-              <a:rPr lang="en-US" sz="1600" i="1" dirty="0"/>
+              <a:rPr lang="en-US" sz="1600" dirty="0"/>
               <a:t> use case </a:t>
             </a:r>
             <a:r>
-              <a:rPr lang="en-US" sz="1600" i="1" dirty="0" err="1"/>
+              <a:rPr lang="en-US" sz="1600" dirty="0" err="1"/>
               <a:t>tổng</a:t>
             </a:r>
             <a:r>
-              <a:rPr lang="en-US" sz="1600" i="1" dirty="0"/>
-              <a:t> </a:t>
-            </a:r>
-            <a:r>
-              <a:rPr lang="en-US" sz="1600" i="1" dirty="0" err="1"/>
+              <a:rPr lang="en-US" sz="1600" dirty="0"/>
+              <a:t> </a:t>
+            </a:r>
+            <a:r>
+              <a:rPr lang="en-US" sz="1600" dirty="0" err="1"/>
               <a:t>quan</a:t>
             </a:r>
-            <a:endParaRPr lang="en-US" sz="1600" i="1" dirty="0"/>
+            <a:endParaRPr lang="en-US" sz="1600" dirty="0"/>
           </a:p>
         </p:txBody>
       </p:sp>

</xml_diff>